<commit_message>
modified poster and barcode rule on weebpage
</commit_message>
<xml_diff>
--- a/Barcodes.pptx
+++ b/Barcodes.pptx
@@ -574,10 +574,55 @@
               <a:buNone/>
             </a:pPr>
             <a:r>
-              <a:rPr lang="en-US"/>
+              <a:rPr lang="en-US" dirty="0"/>
               <a:t>https://www.precisionid.com/code-128-faq/</a:t>
             </a:r>
-            <a:endParaRPr/>
+          </a:p>
+          <a:p>
+            <a:pPr marL="0" lvl="0" indent="0" algn="l" rtl="0">
+              <a:spcBef>
+                <a:spcPts val="0"/>
+              </a:spcBef>
+              <a:spcAft>
+                <a:spcPts val="0"/>
+              </a:spcAft>
+              <a:buNone/>
+            </a:pPr>
+            <a:r>
+              <a:rPr lang="en-US" dirty="0"/>
+              <a:t>https://www.barcodefactory.com/code128-barcode-generator</a:t>
+            </a:r>
+          </a:p>
+          <a:p>
+            <a:pPr marL="0" lvl="0" indent="0" algn="l" rtl="0">
+              <a:spcBef>
+                <a:spcPts val="0"/>
+              </a:spcBef>
+              <a:spcAft>
+                <a:spcPts val="0"/>
+              </a:spcAft>
+              <a:buNone/>
+            </a:pPr>
+            <a:r>
+              <a:rPr lang="en-US" b="1" dirty="0"/>
+              <a:t>https://github.com/porcupineparty/PointOfSale</a:t>
+            </a:r>
+          </a:p>
+          <a:p>
+            <a:pPr marL="0" lvl="0" indent="0" algn="l" rtl="0">
+              <a:spcBef>
+                <a:spcPts val="0"/>
+              </a:spcBef>
+              <a:spcAft>
+                <a:spcPts val="0"/>
+              </a:spcAft>
+              <a:buNone/>
+            </a:pPr>
+            <a:r>
+              <a:rPr lang="en-US" b="1"/>
+              <a:t>https://www.youtube.com/watch?v=dpdzkgHecQ4</a:t>
+            </a:r>
+            <a:endParaRPr b="1" dirty="0"/>
           </a:p>
         </p:txBody>
       </p:sp>
@@ -14525,8 +14570,8 @@
         </p:nvSpPr>
         <p:spPr>
           <a:xfrm>
-            <a:off x="3121894" y="2346774"/>
-            <a:ext cx="21185643" cy="4890653"/>
+            <a:off x="3121894" y="2137757"/>
+            <a:ext cx="21185643" cy="2777965"/>
           </a:xfrm>
           <a:prstGeom prst="rect">
             <a:avLst/>
@@ -14557,14 +14602,14 @@
           <p:nvPr>
             <p:extLst>
               <p:ext uri="{D42A27DB-BD31-4B8C-83A1-F6EECF244321}">
-                <p14:modId xmlns:p14="http://schemas.microsoft.com/office/powerpoint/2010/main" val="563741328"/>
+                <p14:modId xmlns:p14="http://schemas.microsoft.com/office/powerpoint/2010/main" val="3616701928"/>
               </p:ext>
             </p:extLst>
           </p:nvPr>
         </p:nvGraphicFramePr>
         <p:xfrm>
-          <a:off x="3121895" y="5618499"/>
-          <a:ext cx="21185644" cy="19647248"/>
+          <a:off x="3121893" y="5224412"/>
+          <a:ext cx="21185644" cy="19105767"/>
         </p:xfrm>
         <a:graphic>
           <a:graphicData uri="http://schemas.openxmlformats.org/drawingml/2006/table">
@@ -14588,51 +14633,11 @@
                   </a:extLst>
                 </a:gridCol>
               </a:tblGrid>
-              <a:tr h="6436383">
+              <a:tr h="5530674">
                 <a:tc gridSpan="2">
                   <a:txBody>
                     <a:bodyPr/>
                     <a:lstStyle/>
-                    <a:p>
-                      <a:pPr marL="0" lvl="0" indent="0" algn="ctr" rtl="0">
-                        <a:spcBef>
-                          <a:spcPts val="0"/>
-                        </a:spcBef>
-                        <a:spcAft>
-                          <a:spcPts val="0"/>
-                        </a:spcAft>
-                        <a:buNone/>
-                      </a:pPr>
-                      <a:endParaRPr lang="en-US" altLang="zh-TW" sz="10300" dirty="0">
-                        <a:solidFill>
-                          <a:schemeClr val="dk2"/>
-                        </a:solidFill>
-                        <a:latin typeface="Alice"/>
-                        <a:ea typeface="Alice"/>
-                        <a:cs typeface="Alice"/>
-                        <a:sym typeface="Alice"/>
-                      </a:endParaRPr>
-                    </a:p>
-                    <a:p>
-                      <a:pPr marL="0" lvl="0" indent="0" algn="ctr" rtl="0">
-                        <a:spcBef>
-                          <a:spcPts val="0"/>
-                        </a:spcBef>
-                        <a:spcAft>
-                          <a:spcPts val="0"/>
-                        </a:spcAft>
-                        <a:buNone/>
-                      </a:pPr>
-                      <a:endParaRPr lang="en-US" altLang="zh-TW" sz="10300" dirty="0">
-                        <a:solidFill>
-                          <a:schemeClr val="dk2"/>
-                        </a:solidFill>
-                        <a:latin typeface="Alice"/>
-                        <a:ea typeface="Alice"/>
-                        <a:cs typeface="Alice"/>
-                        <a:sym typeface="Alice"/>
-                      </a:endParaRPr>
-                    </a:p>
                     <a:p>
                       <a:pPr marL="0" lvl="0" indent="0" algn="ctr" rtl="0">
                         <a:spcBef>
@@ -14848,7 +14853,7 @@
                           <a:cs typeface="+mn-cs"/>
                           <a:sym typeface="Arial"/>
                         </a:rPr>
-                        <a:t>The blank spaces before and after the barcode. They help the barcode reader to distinguish the barcode from other markings.</a:t>
+                        <a:t>The blank spaces before and after the barcode. They help the barcode reader distinguish the barcode from other markings.</a:t>
                       </a:r>
                       <a:endParaRPr sz="5500" dirty="0">
                         <a:solidFill>
@@ -15024,7 +15029,7 @@
                           <a:cs typeface="+mn-cs"/>
                           <a:sym typeface="Arial"/>
                         </a:rPr>
-                        <a:t>Identifies the beginning of the barcode.</a:t>
+                        <a:t>Identifies the beginning of the barcode. It always holds the same value</a:t>
                       </a:r>
                       <a:endParaRPr sz="5500" dirty="0">
                         <a:solidFill>
@@ -15200,7 +15205,7 @@
                           <a:cs typeface="+mn-cs"/>
                           <a:sym typeface="Arial"/>
                         </a:rPr>
-                        <a:t>Besides hold information, there are also special function characters that may be encoded within the DATA for various purposes. </a:t>
+                        <a:t>This is where the information is stored, usually a string of characters, though it also may include special function characters that may be encoded within the DATA for various purposes. </a:t>
                       </a:r>
                       <a:endParaRPr sz="5500" dirty="0">
                         <a:solidFill>
@@ -15552,7 +15557,7 @@
                           <a:cs typeface="+mn-cs"/>
                           <a:sym typeface="Arial"/>
                         </a:rPr>
-                        <a:t>The STOP character ends the barcode and has a value of 106 for all three Code Sets.  </a:t>
+                        <a:t>The STOP character ends the barcode and has a value of 106.  </a:t>
                       </a:r>
                       <a:endParaRPr sz="5500" dirty="0">
                         <a:solidFill>
@@ -15624,7 +15629,7 @@
         </p:nvCxnSpPr>
         <p:spPr>
           <a:xfrm>
-            <a:off x="3121895" y="5172019"/>
+            <a:off x="3121895" y="4867218"/>
             <a:ext cx="21185644" cy="0"/>
           </a:xfrm>
           <a:prstGeom prst="straightConnector1">
@@ -15644,76 +15649,14 @@
       </p:cxnSp>
       <p:sp>
         <p:nvSpPr>
-          <p:cNvPr id="160" name="Google Shape;160;p31"/>
-          <p:cNvSpPr txBox="1"/>
-          <p:nvPr/>
-        </p:nvSpPr>
-        <p:spPr>
-          <a:xfrm>
-            <a:off x="2919978" y="26454314"/>
-            <a:ext cx="21185644" cy="2189707"/>
-          </a:xfrm>
-          <a:prstGeom prst="rect">
-            <a:avLst/>
-          </a:prstGeom>
-          <a:solidFill>
-            <a:srgbClr val="44546A"/>
-          </a:solidFill>
-          <a:ln w="19050" cap="flat" cmpd="sng">
-            <a:solidFill>
-              <a:schemeClr val="dk1"/>
-            </a:solidFill>
-            <a:prstDash val="solid"/>
-            <a:round/>
-            <a:headEnd type="none" w="sm" len="sm"/>
-            <a:tailEnd type="none" w="sm" len="sm"/>
-          </a:ln>
-        </p:spPr>
-        <p:txBody>
-          <a:bodyPr spcFirstLastPara="1" wrap="square" lIns="312852" tIns="312852" rIns="312852" bIns="312852" anchor="ctr" anchorCtr="0">
-            <a:noAutofit/>
-          </a:bodyPr>
-          <a:lstStyle/>
-          <a:p>
-            <a:pPr algn="ctr" defTabSz="3129077">
-              <a:buClr>
-                <a:srgbClr val="000000"/>
-              </a:buClr>
-            </a:pPr>
-            <a:r>
-              <a:rPr lang="en" sz="10266" kern="0" dirty="0">
-                <a:solidFill>
-                  <a:srgbClr val="F8F8F7"/>
-                </a:solidFill>
-                <a:latin typeface="Alice"/>
-                <a:ea typeface="Alice"/>
-                <a:cs typeface="Alice"/>
-                <a:sym typeface="Alice"/>
-              </a:rPr>
-              <a:t>Quiz</a:t>
-            </a:r>
-            <a:endParaRPr sz="10266" kern="0" dirty="0">
-              <a:solidFill>
-                <a:srgbClr val="F8F8F7"/>
-              </a:solidFill>
-              <a:latin typeface="Alice"/>
-              <a:ea typeface="Alice"/>
-              <a:cs typeface="Alice"/>
-              <a:sym typeface="Alice"/>
-            </a:endParaRPr>
-          </a:p>
-        </p:txBody>
-      </p:sp>
-      <p:sp>
-        <p:nvSpPr>
           <p:cNvPr id="161" name="Google Shape;161;p31"/>
           <p:cNvSpPr txBox="1"/>
           <p:nvPr/>
         </p:nvSpPr>
         <p:spPr>
           <a:xfrm>
-            <a:off x="3326378" y="31109549"/>
-            <a:ext cx="21185644" cy="3372623"/>
+            <a:off x="2919978" y="31683251"/>
+            <a:ext cx="21185644" cy="3494307"/>
           </a:xfrm>
           <a:prstGeom prst="rect">
             <a:avLst/>
@@ -15729,19 +15672,13 @@
           </a:bodyPr>
           <a:lstStyle/>
           <a:p>
-            <a:pPr marL="434594" defTabSz="3129077">
+            <a:pPr algn="ctr" defTabSz="3129077">
               <a:buClr>
-                <a:srgbClr val="2D2A26"/>
+                <a:srgbClr val="000000"/>
               </a:buClr>
               <a:buSzPts val="1600"/>
             </a:pPr>
-            <a:endParaRPr sz="5475" kern="0" dirty="0">
-              <a:solidFill>
-                <a:srgbClr val="2D2A26"/>
-              </a:solidFill>
-              <a:latin typeface="Chivo"/>
-              <a:ea typeface="Chivo"/>
-              <a:cs typeface="Chivo"/>
+            <a:endParaRPr lang="en-US" altLang="zh-TW" sz="4791" dirty="0">
               <a:sym typeface="Chivo"/>
             </a:endParaRPr>
           </a:p>
@@ -15774,7 +15711,7 @@
         </p:blipFill>
         <p:spPr bwMode="auto">
           <a:xfrm>
-            <a:off x="4902834" y="6854634"/>
+            <a:off x="4902833" y="5664728"/>
             <a:ext cx="17623762" cy="4624004"/>
           </a:xfrm>
           <a:prstGeom prst="rect">
@@ -15797,12 +15734,418 @@
           </a:extLst>
         </p:spPr>
       </p:pic>
+      <p:graphicFrame>
+        <p:nvGraphicFramePr>
+          <p:cNvPr id="11" name="Google Shape;158;p31">
+            <a:extLst>
+              <a:ext uri="{FF2B5EF4-FFF2-40B4-BE49-F238E27FC236}">
+                <a16:creationId xmlns:a16="http://schemas.microsoft.com/office/drawing/2014/main" id="{E460AE6E-C8E4-4A1F-A689-459F41CB8473}"/>
+              </a:ext>
+            </a:extLst>
+          </p:cNvPr>
+          <p:cNvGraphicFramePr/>
+          <p:nvPr>
+            <p:extLst>
+              <p:ext uri="{D42A27DB-BD31-4B8C-83A1-F6EECF244321}">
+                <p14:modId xmlns:p14="http://schemas.microsoft.com/office/powerpoint/2010/main" val="3933962337"/>
+              </p:ext>
+            </p:extLst>
+          </p:nvPr>
+        </p:nvGraphicFramePr>
+        <p:xfrm>
+          <a:off x="3123178" y="24687372"/>
+          <a:ext cx="21185644" cy="10088015"/>
+        </p:xfrm>
+        <a:graphic>
+          <a:graphicData uri="http://schemas.openxmlformats.org/drawingml/2006/table">
+            <a:tbl>
+              <a:tblPr>
+                <a:noFill/>
+              </a:tblPr>
+              <a:tblGrid>
+                <a:gridCol w="21185644">
+                  <a:extLst>
+                    <a:ext uri="{9D8B030D-6E8A-4147-A177-3AD203B41FA5}">
+                      <a16:colId xmlns:a16="http://schemas.microsoft.com/office/drawing/2014/main" val="20000"/>
+                    </a:ext>
+                  </a:extLst>
+                </a:gridCol>
+              </a:tblGrid>
+              <a:tr h="2210781">
+                <a:tc>
+                  <a:txBody>
+                    <a:bodyPr/>
+                    <a:lstStyle/>
+                    <a:p>
+                      <a:pPr marL="0" lvl="0" indent="0" algn="ctr" rtl="0">
+                        <a:spcBef>
+                          <a:spcPts val="0"/>
+                        </a:spcBef>
+                        <a:spcAft>
+                          <a:spcPts val="0"/>
+                        </a:spcAft>
+                        <a:buNone/>
+                      </a:pPr>
+                      <a:r>
+                        <a:rPr lang="en-US" sz="10300" dirty="0">
+                          <a:solidFill>
+                            <a:schemeClr val="dk2"/>
+                          </a:solidFill>
+                          <a:latin typeface="Alice"/>
+                          <a:ea typeface="Alice"/>
+                          <a:cs typeface="Alice"/>
+                          <a:sym typeface="Alice"/>
+                        </a:rPr>
+                        <a:t>Quiz</a:t>
+                      </a:r>
+                      <a:endParaRPr sz="10300" dirty="0">
+                        <a:solidFill>
+                          <a:schemeClr val="dk2"/>
+                        </a:solidFill>
+                        <a:latin typeface="Alice"/>
+                        <a:ea typeface="Alice"/>
+                        <a:cs typeface="Alice"/>
+                        <a:sym typeface="Alice"/>
+                      </a:endParaRPr>
+                    </a:p>
+                  </a:txBody>
+                  <a:tcPr marL="312852" marR="312852" marT="312852" marB="312852" anchor="ctr">
+                    <a:lnL w="19050" cap="flat" cmpd="sng">
+                      <a:solidFill>
+                        <a:schemeClr val="dk1"/>
+                      </a:solidFill>
+                      <a:prstDash val="solid"/>
+                      <a:round/>
+                      <a:headEnd type="none" w="sm" len="sm"/>
+                      <a:tailEnd type="none" w="sm" len="sm"/>
+                    </a:lnL>
+                    <a:lnR w="19050" cap="flat" cmpd="sng">
+                      <a:solidFill>
+                        <a:schemeClr val="dk1"/>
+                      </a:solidFill>
+                      <a:prstDash val="solid"/>
+                      <a:round/>
+                      <a:headEnd type="none" w="sm" len="sm"/>
+                      <a:tailEnd type="none" w="sm" len="sm"/>
+                    </a:lnR>
+                    <a:lnT w="19050" cap="flat" cmpd="sng">
+                      <a:solidFill>
+                        <a:schemeClr val="dk1"/>
+                      </a:solidFill>
+                      <a:prstDash val="solid"/>
+                      <a:round/>
+                      <a:headEnd type="none" w="sm" len="sm"/>
+                      <a:tailEnd type="none" w="sm" len="sm"/>
+                    </a:lnT>
+                    <a:lnB w="19050" cap="flat" cmpd="sng">
+                      <a:solidFill>
+                        <a:schemeClr val="dk1"/>
+                      </a:solidFill>
+                      <a:prstDash val="solid"/>
+                      <a:round/>
+                      <a:headEnd type="none" w="sm" len="sm"/>
+                      <a:tailEnd type="none" w="sm" len="sm"/>
+                    </a:lnB>
+                    <a:solidFill>
+                      <a:srgbClr val="44546A"/>
+                    </a:solidFill>
+                  </a:tcPr>
+                </a:tc>
+                <a:extLst>
+                  <a:ext uri="{0D108BD9-81ED-4DB2-BD59-A6C34878D82A}">
+                    <a16:rowId xmlns:a16="http://schemas.microsoft.com/office/drawing/2014/main" val="10000"/>
+                  </a:ext>
+                </a:extLst>
+              </a:tr>
+              <a:tr h="3571002">
+                <a:tc>
+                  <a:txBody>
+                    <a:bodyPr/>
+                    <a:lstStyle/>
+                    <a:p>
+                      <a:pPr marL="0" lvl="0" indent="0" algn="l" rtl="0">
+                        <a:spcBef>
+                          <a:spcPts val="0"/>
+                        </a:spcBef>
+                        <a:spcAft>
+                          <a:spcPts val="0"/>
+                        </a:spcAft>
+                        <a:buNone/>
+                      </a:pPr>
+                      <a:r>
+                        <a:rPr lang="en-US" sz="4791" b="0" i="0" u="none" strike="noStrike" cap="none" dirty="0">
+                          <a:solidFill>
+                            <a:schemeClr val="tx1"/>
+                          </a:solidFill>
+                          <a:effectLst/>
+                          <a:latin typeface="+mn-lt"/>
+                          <a:ea typeface="+mn-ea"/>
+                          <a:cs typeface="+mn-cs"/>
+                          <a:sym typeface="Alice"/>
+                        </a:rPr>
+                        <a:t>There are 4 sizes of bars within the barcode each size encodes a number of 1’s or 0’s the smallest including only 1 value while the biggest is 4 values. </a:t>
+                      </a:r>
+                    </a:p>
+                    <a:p>
+                      <a:pPr marL="0" lvl="0" indent="0" algn="l" rtl="0">
+                        <a:spcBef>
+                          <a:spcPts val="0"/>
+                        </a:spcBef>
+                        <a:spcAft>
+                          <a:spcPts val="0"/>
+                        </a:spcAft>
+                        <a:buNone/>
+                      </a:pPr>
+                      <a:r>
+                        <a:rPr lang="en-US" sz="4791" b="0" i="0" u="none" strike="noStrike" cap="none" dirty="0">
+                          <a:solidFill>
+                            <a:schemeClr val="tx1"/>
+                          </a:solidFill>
+                          <a:effectLst/>
+                          <a:latin typeface="+mn-lt"/>
+                          <a:ea typeface="+mn-ea"/>
+                          <a:cs typeface="+mn-cs"/>
+                          <a:sym typeface="Alice"/>
+                        </a:rPr>
+                        <a:t>If a bar is black it is a 1, if it is white it encodes a 0. </a:t>
+                      </a:r>
+                    </a:p>
+                    <a:p>
+                      <a:pPr marL="0" lvl="0" indent="0" algn="l" rtl="0">
+                        <a:spcBef>
+                          <a:spcPts val="0"/>
+                        </a:spcBef>
+                        <a:spcAft>
+                          <a:spcPts val="0"/>
+                        </a:spcAft>
+                        <a:buNone/>
+                      </a:pPr>
+                      <a:r>
+                        <a:rPr lang="en-US" sz="4000" b="0" i="0" u="none" strike="noStrike" cap="none" dirty="0">
+                          <a:solidFill>
+                            <a:schemeClr val="tx1"/>
+                          </a:solidFill>
+                          <a:effectLst/>
+                          <a:latin typeface="+mn-lt"/>
+                          <a:ea typeface="+mn-ea"/>
+                          <a:cs typeface="+mn-cs"/>
+                          <a:sym typeface="Alice"/>
+                        </a:rPr>
+                        <a:t>TIP: only account for the values in the data section of the barcode.</a:t>
+                      </a:r>
+                    </a:p>
+                  </a:txBody>
+                  <a:tcPr marL="312852" marR="312852" marT="312852" marB="312852" anchor="ctr">
+                    <a:lnL w="19050" cap="flat" cmpd="sng">
+                      <a:solidFill>
+                        <a:schemeClr val="dk1"/>
+                      </a:solidFill>
+                      <a:prstDash val="solid"/>
+                      <a:round/>
+                      <a:headEnd type="none" w="sm" len="sm"/>
+                      <a:tailEnd type="none" w="sm" len="sm"/>
+                    </a:lnL>
+                    <a:lnR w="19050" cap="flat" cmpd="sng" algn="ctr">
+                      <a:solidFill>
+                        <a:schemeClr val="dk1"/>
+                      </a:solidFill>
+                      <a:prstDash val="solid"/>
+                      <a:round/>
+                      <a:headEnd type="none" w="sm" len="sm"/>
+                      <a:tailEnd type="none" w="sm" len="sm"/>
+                    </a:lnR>
+                    <a:lnT w="19050" cap="flat" cmpd="sng" algn="ctr">
+                      <a:solidFill>
+                        <a:schemeClr val="dk1"/>
+                      </a:solidFill>
+                      <a:prstDash val="solid"/>
+                      <a:round/>
+                      <a:headEnd type="none" w="sm" len="sm"/>
+                      <a:tailEnd type="none" w="sm" len="sm"/>
+                    </a:lnT>
+                    <a:lnB w="19050" cap="flat" cmpd="sng" algn="ctr">
+                      <a:solidFill>
+                        <a:schemeClr val="dk1"/>
+                      </a:solidFill>
+                      <a:prstDash val="solid"/>
+                      <a:round/>
+                      <a:headEnd type="none" w="sm" len="sm"/>
+                      <a:tailEnd type="none" w="sm" len="sm"/>
+                    </a:lnB>
+                  </a:tcPr>
+                </a:tc>
+                <a:extLst>
+                  <a:ext uri="{0D108BD9-81ED-4DB2-BD59-A6C34878D82A}">
+                    <a16:rowId xmlns:a16="http://schemas.microsoft.com/office/drawing/2014/main" val="10002"/>
+                  </a:ext>
+                </a:extLst>
+              </a:tr>
+              <a:tr h="4306232">
+                <a:tc>
+                  <a:txBody>
+                    <a:bodyPr/>
+                    <a:lstStyle/>
+                    <a:p>
+                      <a:pPr marL="0" lvl="0" indent="0" algn="l" rtl="0">
+                        <a:spcBef>
+                          <a:spcPts val="0"/>
+                        </a:spcBef>
+                        <a:spcAft>
+                          <a:spcPts val="0"/>
+                        </a:spcAft>
+                        <a:buNone/>
+                      </a:pPr>
+                      <a:endParaRPr lang="en-US" sz="4791" b="0" i="0" u="none" strike="noStrike" cap="none" dirty="0">
+                        <a:solidFill>
+                          <a:schemeClr val="tx1"/>
+                        </a:solidFill>
+                        <a:effectLst/>
+                        <a:latin typeface="+mn-lt"/>
+                        <a:ea typeface="+mn-ea"/>
+                        <a:cs typeface="+mn-cs"/>
+                        <a:sym typeface="Alice"/>
+                      </a:endParaRPr>
+                    </a:p>
+                    <a:p>
+                      <a:pPr marL="0" lvl="0" indent="0" algn="l" rtl="0">
+                        <a:spcBef>
+                          <a:spcPts val="0"/>
+                        </a:spcBef>
+                        <a:spcAft>
+                          <a:spcPts val="0"/>
+                        </a:spcAft>
+                        <a:buNone/>
+                      </a:pPr>
+                      <a:endParaRPr lang="en-US" sz="4791" b="0" i="0" u="none" strike="noStrike" cap="none" dirty="0">
+                        <a:solidFill>
+                          <a:schemeClr val="tx1"/>
+                        </a:solidFill>
+                        <a:effectLst/>
+                        <a:latin typeface="+mn-lt"/>
+                        <a:ea typeface="+mn-ea"/>
+                        <a:cs typeface="+mn-cs"/>
+                        <a:sym typeface="Alice"/>
+                      </a:endParaRPr>
+                    </a:p>
+                    <a:p>
+                      <a:pPr marL="0" lvl="0" indent="0" algn="l" rtl="0">
+                        <a:spcBef>
+                          <a:spcPts val="0"/>
+                        </a:spcBef>
+                        <a:spcAft>
+                          <a:spcPts val="0"/>
+                        </a:spcAft>
+                        <a:buNone/>
+                      </a:pPr>
+                      <a:endParaRPr lang="en-US" sz="4791" b="0" i="0" u="none" strike="noStrike" cap="none" dirty="0">
+                        <a:solidFill>
+                          <a:schemeClr val="tx1"/>
+                        </a:solidFill>
+                        <a:effectLst/>
+                        <a:latin typeface="+mn-lt"/>
+                        <a:ea typeface="+mn-ea"/>
+                        <a:cs typeface="+mn-cs"/>
+                        <a:sym typeface="Alice"/>
+                      </a:endParaRPr>
+                    </a:p>
+                    <a:p>
+                      <a:pPr marL="0" lvl="0" indent="0" algn="l" rtl="0">
+                        <a:spcBef>
+                          <a:spcPts val="0"/>
+                        </a:spcBef>
+                        <a:spcAft>
+                          <a:spcPts val="0"/>
+                        </a:spcAft>
+                        <a:buNone/>
+                      </a:pPr>
+                      <a:endParaRPr lang="en-US" sz="4791" b="0" i="0" u="none" strike="noStrike" cap="none" dirty="0">
+                        <a:solidFill>
+                          <a:schemeClr val="tx1"/>
+                        </a:solidFill>
+                        <a:effectLst/>
+                        <a:latin typeface="+mn-lt"/>
+                        <a:ea typeface="+mn-ea"/>
+                        <a:cs typeface="+mn-cs"/>
+                        <a:sym typeface="Alice"/>
+                      </a:endParaRPr>
+                    </a:p>
+                    <a:p>
+                      <a:pPr marL="0" lvl="0" indent="0" algn="l" rtl="0">
+                        <a:spcBef>
+                          <a:spcPts val="0"/>
+                        </a:spcBef>
+                        <a:spcAft>
+                          <a:spcPts val="0"/>
+                        </a:spcAft>
+                        <a:buNone/>
+                      </a:pPr>
+                      <a:endParaRPr lang="en-US" sz="4791" b="0" i="0" u="none" strike="noStrike" cap="none" dirty="0">
+                        <a:solidFill>
+                          <a:schemeClr val="tx1"/>
+                        </a:solidFill>
+                        <a:effectLst/>
+                        <a:latin typeface="+mn-lt"/>
+                        <a:ea typeface="+mn-ea"/>
+                        <a:cs typeface="+mn-cs"/>
+                        <a:sym typeface="Alice"/>
+                      </a:endParaRPr>
+                    </a:p>
+                  </a:txBody>
+                  <a:tcPr marL="312852" marR="312852" marT="312852" marB="312852" anchor="ctr">
+                    <a:lnL w="19050" cap="flat" cmpd="sng">
+                      <a:solidFill>
+                        <a:schemeClr val="dk1"/>
+                      </a:solidFill>
+                      <a:prstDash val="solid"/>
+                      <a:round/>
+                      <a:headEnd type="none" w="sm" len="sm"/>
+                      <a:tailEnd type="none" w="sm" len="sm"/>
+                    </a:lnL>
+                    <a:lnR w="19050" cap="flat" cmpd="sng" algn="ctr">
+                      <a:solidFill>
+                        <a:schemeClr val="dk1"/>
+                      </a:solidFill>
+                      <a:prstDash val="solid"/>
+                      <a:round/>
+                      <a:headEnd type="none" w="sm" len="sm"/>
+                      <a:tailEnd type="none" w="sm" len="sm"/>
+                    </a:lnR>
+                    <a:lnT w="19050" cap="flat" cmpd="sng" algn="ctr">
+                      <a:solidFill>
+                        <a:schemeClr val="dk1"/>
+                      </a:solidFill>
+                      <a:prstDash val="solid"/>
+                      <a:round/>
+                      <a:headEnd type="none" w="sm" len="sm"/>
+                      <a:tailEnd type="none" w="sm" len="sm"/>
+                    </a:lnT>
+                    <a:lnB w="19050" cap="flat" cmpd="sng" algn="ctr">
+                      <a:solidFill>
+                        <a:schemeClr val="dk1"/>
+                      </a:solidFill>
+                      <a:prstDash val="solid"/>
+                      <a:round/>
+                      <a:headEnd type="none" w="sm" len="sm"/>
+                      <a:tailEnd type="none" w="sm" len="sm"/>
+                    </a:lnB>
+                  </a:tcPr>
+                </a:tc>
+                <a:extLst>
+                  <a:ext uri="{0D108BD9-81ED-4DB2-BD59-A6C34878D82A}">
+                    <a16:rowId xmlns:a16="http://schemas.microsoft.com/office/drawing/2014/main" val="2547861052"/>
+                  </a:ext>
+                </a:extLst>
+              </a:tr>
+            </a:tbl>
+          </a:graphicData>
+        </a:graphic>
+      </p:graphicFrame>
       <p:pic>
         <p:nvPicPr>
-          <p:cNvPr id="2" name="圖片 1">
+          <p:cNvPr id="12" name="圖片 11">
             <a:extLst>
               <a:ext uri="{FF2B5EF4-FFF2-40B4-BE49-F238E27FC236}">
-                <a16:creationId xmlns:a16="http://schemas.microsoft.com/office/drawing/2014/main" id="{FDEAF62C-B440-4BFC-A43E-AE7A38C5A64B}"/>
+                <a16:creationId xmlns:a16="http://schemas.microsoft.com/office/drawing/2014/main" id="{5EF88CC9-30DD-4D24-9500-5AA3F37F1C78}"/>
               </a:ext>
             </a:extLst>
           </p:cNvPr>
@@ -15818,7 +16161,7 @@
         </p:blipFill>
         <p:spPr>
           <a:xfrm>
-            <a:off x="14969932" y="29477043"/>
+            <a:off x="14971218" y="30749792"/>
             <a:ext cx="8681341" cy="3688451"/>
           </a:xfrm>
           <a:prstGeom prst="rect">
@@ -15828,10 +16171,10 @@
       </p:pic>
       <p:pic>
         <p:nvPicPr>
-          <p:cNvPr id="3" name="圖片 2">
+          <p:cNvPr id="13" name="圖片 12">
             <a:extLst>
               <a:ext uri="{FF2B5EF4-FFF2-40B4-BE49-F238E27FC236}">
-                <a16:creationId xmlns:a16="http://schemas.microsoft.com/office/drawing/2014/main" id="{8AD18E0B-75BD-4B1C-BAAE-337A3C0BE098}"/>
+                <a16:creationId xmlns:a16="http://schemas.microsoft.com/office/drawing/2014/main" id="{972693C7-4297-4F79-899B-39A42AB7586F}"/>
               </a:ext>
             </a:extLst>
           </p:cNvPr>
@@ -15847,7 +16190,7 @@
         </p:blipFill>
         <p:spPr>
           <a:xfrm>
-            <a:off x="3780727" y="29448587"/>
+            <a:off x="3782013" y="30749792"/>
             <a:ext cx="8226993" cy="3716907"/>
           </a:xfrm>
           <a:prstGeom prst="rect">

</xml_diff>